<commit_message>
next version with some improvements
</commit_message>
<xml_diff>
--- a/server/images/Presentation1.pptx
+++ b/server/images/Presentation1.pptx
@@ -289,7 +289,7 @@
           <a:p>
             <a:fld id="{C23ACAD9-D14F-F04F-9BE2-297493C7F83D}" type="datetimeFigureOut">
               <a:rPr lang="en-US" smtClean="0"/>
-              <a:t>12/28/15</a:t>
+              <a:t>12/30/15</a:t>
             </a:fld>
             <a:endParaRPr lang="en-US"/>
           </a:p>
@@ -459,7 +459,7 @@
           <a:p>
             <a:fld id="{C23ACAD9-D14F-F04F-9BE2-297493C7F83D}" type="datetimeFigureOut">
               <a:rPr lang="en-US" smtClean="0"/>
-              <a:t>12/28/15</a:t>
+              <a:t>12/30/15</a:t>
             </a:fld>
             <a:endParaRPr lang="en-US"/>
           </a:p>
@@ -639,7 +639,7 @@
           <a:p>
             <a:fld id="{C23ACAD9-D14F-F04F-9BE2-297493C7F83D}" type="datetimeFigureOut">
               <a:rPr lang="en-US" smtClean="0"/>
-              <a:t>12/28/15</a:t>
+              <a:t>12/30/15</a:t>
             </a:fld>
             <a:endParaRPr lang="en-US"/>
           </a:p>
@@ -809,7 +809,7 @@
           <a:p>
             <a:fld id="{C23ACAD9-D14F-F04F-9BE2-297493C7F83D}" type="datetimeFigureOut">
               <a:rPr lang="en-US" smtClean="0"/>
-              <a:t>12/28/15</a:t>
+              <a:t>12/30/15</a:t>
             </a:fld>
             <a:endParaRPr lang="en-US"/>
           </a:p>
@@ -1055,7 +1055,7 @@
           <a:p>
             <a:fld id="{C23ACAD9-D14F-F04F-9BE2-297493C7F83D}" type="datetimeFigureOut">
               <a:rPr lang="en-US" smtClean="0"/>
-              <a:t>12/28/15</a:t>
+              <a:t>12/30/15</a:t>
             </a:fld>
             <a:endParaRPr lang="en-US"/>
           </a:p>
@@ -1343,7 +1343,7 @@
           <a:p>
             <a:fld id="{C23ACAD9-D14F-F04F-9BE2-297493C7F83D}" type="datetimeFigureOut">
               <a:rPr lang="en-US" smtClean="0"/>
-              <a:t>12/28/15</a:t>
+              <a:t>12/30/15</a:t>
             </a:fld>
             <a:endParaRPr lang="en-US"/>
           </a:p>
@@ -1765,7 +1765,7 @@
           <a:p>
             <a:fld id="{C23ACAD9-D14F-F04F-9BE2-297493C7F83D}" type="datetimeFigureOut">
               <a:rPr lang="en-US" smtClean="0"/>
-              <a:t>12/28/15</a:t>
+              <a:t>12/30/15</a:t>
             </a:fld>
             <a:endParaRPr lang="en-US"/>
           </a:p>
@@ -1883,7 +1883,7 @@
           <a:p>
             <a:fld id="{C23ACAD9-D14F-F04F-9BE2-297493C7F83D}" type="datetimeFigureOut">
               <a:rPr lang="en-US" smtClean="0"/>
-              <a:t>12/28/15</a:t>
+              <a:t>12/30/15</a:t>
             </a:fld>
             <a:endParaRPr lang="en-US"/>
           </a:p>
@@ -1978,7 +1978,7 @@
           <a:p>
             <a:fld id="{C23ACAD9-D14F-F04F-9BE2-297493C7F83D}" type="datetimeFigureOut">
               <a:rPr lang="en-US" smtClean="0"/>
-              <a:t>12/28/15</a:t>
+              <a:t>12/30/15</a:t>
             </a:fld>
             <a:endParaRPr lang="en-US"/>
           </a:p>
@@ -2255,7 +2255,7 @@
           <a:p>
             <a:fld id="{C23ACAD9-D14F-F04F-9BE2-297493C7F83D}" type="datetimeFigureOut">
               <a:rPr lang="en-US" smtClean="0"/>
-              <a:t>12/28/15</a:t>
+              <a:t>12/30/15</a:t>
             </a:fld>
             <a:endParaRPr lang="en-US"/>
           </a:p>
@@ -2508,7 +2508,7 @@
           <a:p>
             <a:fld id="{C23ACAD9-D14F-F04F-9BE2-297493C7F83D}" type="datetimeFigureOut">
               <a:rPr lang="en-US" smtClean="0"/>
-              <a:t>12/28/15</a:t>
+              <a:t>12/30/15</a:t>
             </a:fld>
             <a:endParaRPr lang="en-US"/>
           </a:p>
@@ -2721,7 +2721,7 @@
           <a:p>
             <a:fld id="{C23ACAD9-D14F-F04F-9BE2-297493C7F83D}" type="datetimeFigureOut">
               <a:rPr lang="en-US" smtClean="0"/>
-              <a:t>12/28/15</a:t>
+              <a:t>12/30/15</a:t>
             </a:fld>
             <a:endParaRPr lang="en-US"/>
           </a:p>
@@ -3202,10 +3202,10 @@
                   </a:schemeClr>
                 </a:solidFill>
                 <a:effectLst>
-                  <a:outerShdw blurRad="41275" dist="20320" dir="1800000" algn="tl" rotWithShape="0">
-                    <a:srgbClr val="000000">
-                      <a:alpha val="40000"/>
-                    </a:srgbClr>
+                  <a:outerShdw blurRad="63500" dist="50800" algn="l" rotWithShape="0">
+                    <a:prstClr val="black">
+                      <a:alpha val="69000"/>
+                    </a:prstClr>
                   </a:outerShdw>
                 </a:effectLst>
               </a:rPr>
@@ -3226,38 +3226,14 @@
                   </a:schemeClr>
                 </a:solidFill>
                 <a:effectLst>
-                  <a:outerShdw blurRad="41275" dist="20320" dir="1800000" algn="tl" rotWithShape="0">
-                    <a:srgbClr val="000000">
-                      <a:alpha val="40000"/>
-                    </a:srgbClr>
+                  <a:outerShdw blurRad="63500" dist="50800" algn="l" rotWithShape="0">
+                    <a:prstClr val="black">
+                      <a:alpha val="69000"/>
+                    </a:prstClr>
                   </a:outerShdw>
                 </a:effectLst>
               </a:rPr>
-              <a:t>ntuits</a:t>
-            </a:r>
-            <a:r>
-              <a:rPr lang="en-US" sz="23000" b="1" cap="none" spc="0" dirty="0" smtClean="0">
-                <a:ln w="50800" cap="sq" cmpd="sng">
-                  <a:solidFill>
-                    <a:srgbClr val="3476D5"/>
-                  </a:solidFill>
-                  <a:prstDash val="solid"/>
-                </a:ln>
-                <a:solidFill>
-                  <a:schemeClr val="bg2">
-                    <a:tint val="85000"/>
-                    <a:satMod val="155000"/>
-                  </a:schemeClr>
-                </a:solidFill>
-                <a:effectLst>
-                  <a:outerShdw blurRad="41275" dist="20320" dir="1800000" algn="tl" rotWithShape="0">
-                    <a:srgbClr val="000000">
-                      <a:alpha val="40000"/>
-                    </a:srgbClr>
-                  </a:outerShdw>
-                </a:effectLst>
-              </a:rPr>
-              <a:t>.</a:t>
+              <a:t>ntuits.</a:t>
             </a:r>
             <a:endParaRPr lang="en-US" sz="23000" b="1" cap="none" spc="0" dirty="0">
               <a:ln w="50800" cap="sq" cmpd="sng">
@@ -3273,10 +3249,10 @@
                 </a:schemeClr>
               </a:solidFill>
               <a:effectLst>
-                <a:outerShdw blurRad="41275" dist="20320" dir="1800000" algn="tl" rotWithShape="0">
-                  <a:srgbClr val="000000">
-                    <a:alpha val="40000"/>
-                  </a:srgbClr>
+                <a:outerShdw blurRad="63500" dist="50800" algn="l" rotWithShape="0">
+                  <a:prstClr val="black">
+                    <a:alpha val="69000"/>
+                  </a:prstClr>
                 </a:outerShdw>
               </a:effectLst>
             </a:endParaRPr>

</xml_diff>